<commit_message>
Back to top button
* Shown if  pageYOffset > 500
* v1.7.0
</commit_message>
<xml_diff>
--- a/media/components.pptx
+++ b/media/components.pptx
@@ -197,7 +197,7 @@
           <a:p>
             <a:fld id="{2493DBFB-1373-FB44-B528-39E7BE5C2A0C}" type="datetimeFigureOut">
               <a:rPr lang="sv-SE" smtClean="0"/>
-              <a:t>2019-08-30</a:t>
+              <a:t>2020-12-09</a:t>
             </a:fld>
             <a:endParaRPr lang="sv-SE"/>
           </a:p>
@@ -595,7 +595,7 @@
           <a:p>
             <a:fld id="{0199F140-DCCC-1C43-B697-AE5A4988A779}" type="datetimeFigureOut">
               <a:rPr lang="sv-SE" smtClean="0"/>
-              <a:t>2019-08-30</a:t>
+              <a:t>2020-12-09</a:t>
             </a:fld>
             <a:endParaRPr lang="sv-SE"/>
           </a:p>
@@ -765,7 +765,7 @@
           <a:p>
             <a:fld id="{0199F140-DCCC-1C43-B697-AE5A4988A779}" type="datetimeFigureOut">
               <a:rPr lang="sv-SE" smtClean="0"/>
-              <a:t>2019-08-30</a:t>
+              <a:t>2020-12-09</a:t>
             </a:fld>
             <a:endParaRPr lang="sv-SE"/>
           </a:p>
@@ -945,7 +945,7 @@
           <a:p>
             <a:fld id="{0199F140-DCCC-1C43-B697-AE5A4988A779}" type="datetimeFigureOut">
               <a:rPr lang="sv-SE" smtClean="0"/>
-              <a:t>2019-08-30</a:t>
+              <a:t>2020-12-09</a:t>
             </a:fld>
             <a:endParaRPr lang="sv-SE"/>
           </a:p>
@@ -1115,7 +1115,7 @@
           <a:p>
             <a:fld id="{0199F140-DCCC-1C43-B697-AE5A4988A779}" type="datetimeFigureOut">
               <a:rPr lang="sv-SE" smtClean="0"/>
-              <a:t>2019-08-30</a:t>
+              <a:t>2020-12-09</a:t>
             </a:fld>
             <a:endParaRPr lang="sv-SE"/>
           </a:p>
@@ -1359,7 +1359,7 @@
           <a:p>
             <a:fld id="{0199F140-DCCC-1C43-B697-AE5A4988A779}" type="datetimeFigureOut">
               <a:rPr lang="sv-SE" smtClean="0"/>
-              <a:t>2019-08-30</a:t>
+              <a:t>2020-12-09</a:t>
             </a:fld>
             <a:endParaRPr lang="sv-SE"/>
           </a:p>
@@ -1591,7 +1591,7 @@
           <a:p>
             <a:fld id="{0199F140-DCCC-1C43-B697-AE5A4988A779}" type="datetimeFigureOut">
               <a:rPr lang="sv-SE" smtClean="0"/>
-              <a:t>2019-08-30</a:t>
+              <a:t>2020-12-09</a:t>
             </a:fld>
             <a:endParaRPr lang="sv-SE"/>
           </a:p>
@@ -1958,7 +1958,7 @@
           <a:p>
             <a:fld id="{0199F140-DCCC-1C43-B697-AE5A4988A779}" type="datetimeFigureOut">
               <a:rPr lang="sv-SE" smtClean="0"/>
-              <a:t>2019-08-30</a:t>
+              <a:t>2020-12-09</a:t>
             </a:fld>
             <a:endParaRPr lang="sv-SE"/>
           </a:p>
@@ -2076,7 +2076,7 @@
           <a:p>
             <a:fld id="{0199F140-DCCC-1C43-B697-AE5A4988A779}" type="datetimeFigureOut">
               <a:rPr lang="sv-SE" smtClean="0"/>
-              <a:t>2019-08-30</a:t>
+              <a:t>2020-12-09</a:t>
             </a:fld>
             <a:endParaRPr lang="sv-SE"/>
           </a:p>
@@ -2171,7 +2171,7 @@
           <a:p>
             <a:fld id="{0199F140-DCCC-1C43-B697-AE5A4988A779}" type="datetimeFigureOut">
               <a:rPr lang="sv-SE" smtClean="0"/>
-              <a:t>2019-08-30</a:t>
+              <a:t>2020-12-09</a:t>
             </a:fld>
             <a:endParaRPr lang="sv-SE"/>
           </a:p>
@@ -2448,7 +2448,7 @@
           <a:p>
             <a:fld id="{0199F140-DCCC-1C43-B697-AE5A4988A779}" type="datetimeFigureOut">
               <a:rPr lang="sv-SE" smtClean="0"/>
-              <a:t>2019-08-30</a:t>
+              <a:t>2020-12-09</a:t>
             </a:fld>
             <a:endParaRPr lang="sv-SE"/>
           </a:p>
@@ -2705,7 +2705,7 @@
           <a:p>
             <a:fld id="{0199F140-DCCC-1C43-B697-AE5A4988A779}" type="datetimeFigureOut">
               <a:rPr lang="sv-SE" smtClean="0"/>
-              <a:t>2019-08-30</a:t>
+              <a:t>2020-12-09</a:t>
             </a:fld>
             <a:endParaRPr lang="sv-SE"/>
           </a:p>
@@ -2918,7 +2918,7 @@
           <a:p>
             <a:fld id="{0199F140-DCCC-1C43-B697-AE5A4988A779}" type="datetimeFigureOut">
               <a:rPr lang="sv-SE" smtClean="0"/>
-              <a:t>2019-08-30</a:t>
+              <a:t>2020-12-09</a:t>
             </a:fld>
             <a:endParaRPr lang="sv-SE"/>
           </a:p>
@@ -4849,6 +4849,95 @@
                 <a:srgbClr val="00B0F0"/>
               </a:solidFill>
             </a:endParaRPr>
+          </a:p>
+        </p:txBody>
+      </p:sp>
+      <p:pic>
+        <p:nvPicPr>
+          <p:cNvPr id="4" name="Bildobjekt 3">
+            <a:extLst>
+              <a:ext uri="{FF2B5EF4-FFF2-40B4-BE49-F238E27FC236}">
+                <a16:creationId xmlns:a16="http://schemas.microsoft.com/office/drawing/2014/main" id="{AB4847C6-44D4-3141-A8C5-845AF6702EF8}"/>
+              </a:ext>
+            </a:extLst>
+          </p:cNvPr>
+          <p:cNvPicPr>
+            <a:picLocks noChangeAspect="1"/>
+          </p:cNvPicPr>
+          <p:nvPr/>
+        </p:nvPicPr>
+        <p:blipFill>
+          <a:blip r:embed="rId4"/>
+          <a:stretch>
+            <a:fillRect/>
+          </a:stretch>
+        </p:blipFill>
+        <p:spPr>
+          <a:xfrm>
+            <a:off x="13990637" y="10556046"/>
+            <a:ext cx="1041400" cy="406400"/>
+          </a:xfrm>
+          <a:prstGeom prst="rect">
+            <a:avLst/>
+          </a:prstGeom>
+        </p:spPr>
+      </p:pic>
+      <p:sp>
+        <p:nvSpPr>
+          <p:cNvPr id="39" name="Rektangel 38">
+            <a:extLst>
+              <a:ext uri="{FF2B5EF4-FFF2-40B4-BE49-F238E27FC236}">
+                <a16:creationId xmlns:a16="http://schemas.microsoft.com/office/drawing/2014/main" id="{17233EC3-2974-0E4C-B031-BBE3D83BD79A}"/>
+              </a:ext>
+            </a:extLst>
+          </p:cNvPr>
+          <p:cNvSpPr/>
+          <p:nvPr/>
+        </p:nvSpPr>
+        <p:spPr>
+          <a:xfrm>
+            <a:off x="12898877" y="10182505"/>
+            <a:ext cx="2133160" cy="814803"/>
+          </a:xfrm>
+          <a:prstGeom prst="rect">
+            <a:avLst/>
+          </a:prstGeom>
+          <a:noFill/>
+          <a:ln w="28575">
+            <a:solidFill>
+              <a:srgbClr val="FF0000"/>
+            </a:solidFill>
+          </a:ln>
+        </p:spPr>
+        <p:style>
+          <a:lnRef idx="2">
+            <a:schemeClr val="accent1">
+              <a:shade val="50000"/>
+            </a:schemeClr>
+          </a:lnRef>
+          <a:fillRef idx="1">
+            <a:schemeClr val="accent1"/>
+          </a:fillRef>
+          <a:effectRef idx="0">
+            <a:schemeClr val="accent1"/>
+          </a:effectRef>
+          <a:fontRef idx="minor">
+            <a:schemeClr val="lt1"/>
+          </a:fontRef>
+        </p:style>
+        <p:txBody>
+          <a:bodyPr rtlCol="0" anchor="ctr"/>
+          <a:lstStyle/>
+          <a:p>
+            <a:pPr algn="ctr"/>
+            <a:r>
+              <a:rPr lang="sv-SE"/>
+              <a:t>LuToTop</a:t>
+            </a:r>
+          </a:p>
+          <a:p>
+            <a:pPr algn="ctr"/>
+            <a:endParaRPr lang="sv-SE"/>
           </a:p>
         </p:txBody>
       </p:sp>

</xml_diff>